<commit_message>
Change documentation of presentation and documentation
</commit_message>
<xml_diff>
--- a/documentation/presentation.pptx
+++ b/documentation/presentation.pptx
@@ -372,7 +372,7 @@
           <a:p>
             <a:fld id="{07F39D79-7497-4A8A-8B71-6E93BD0E3C8A}" type="datetimeFigureOut">
               <a:rPr lang="en-GB" smtClean="0"/>
-              <a:t>09/05/2025</a:t>
+              <a:t>11/05/2025</a:t>
             </a:fld>
             <a:endParaRPr lang="en-GB"/>
           </a:p>
@@ -663,7 +663,7 @@
           <a:p>
             <a:fld id="{07F39D79-7497-4A8A-8B71-6E93BD0E3C8A}" type="datetimeFigureOut">
               <a:rPr lang="en-GB" smtClean="0"/>
-              <a:t>09/05/2025</a:t>
+              <a:t>11/05/2025</a:t>
             </a:fld>
             <a:endParaRPr lang="en-GB"/>
           </a:p>
@@ -911,7 +911,7 @@
           <a:p>
             <a:fld id="{07F39D79-7497-4A8A-8B71-6E93BD0E3C8A}" type="datetimeFigureOut">
               <a:rPr lang="en-GB" smtClean="0"/>
-              <a:t>09/05/2025</a:t>
+              <a:t>11/05/2025</a:t>
             </a:fld>
             <a:endParaRPr lang="en-GB"/>
           </a:p>
@@ -1447,7 +1447,7 @@
           <a:p>
             <a:fld id="{07F39D79-7497-4A8A-8B71-6E93BD0E3C8A}" type="datetimeFigureOut">
               <a:rPr lang="en-GB" smtClean="0"/>
-              <a:t>09/05/2025</a:t>
+              <a:t>11/05/2025</a:t>
             </a:fld>
             <a:endParaRPr lang="en-GB"/>
           </a:p>
@@ -1695,7 +1695,7 @@
           <a:p>
             <a:fld id="{07F39D79-7497-4A8A-8B71-6E93BD0E3C8A}" type="datetimeFigureOut">
               <a:rPr lang="en-GB" smtClean="0"/>
-              <a:t>09/05/2025</a:t>
+              <a:t>11/05/2025</a:t>
             </a:fld>
             <a:endParaRPr lang="en-GB"/>
           </a:p>
@@ -2238,7 +2238,7 @@
           <a:p>
             <a:fld id="{07F39D79-7497-4A8A-8B71-6E93BD0E3C8A}" type="datetimeFigureOut">
               <a:rPr lang="en-GB" smtClean="0"/>
-              <a:t>09/05/2025</a:t>
+              <a:t>11/05/2025</a:t>
             </a:fld>
             <a:endParaRPr lang="en-GB"/>
           </a:p>
@@ -2548,7 +2548,7 @@
           <a:p>
             <a:fld id="{07F39D79-7497-4A8A-8B71-6E93BD0E3C8A}" type="datetimeFigureOut">
               <a:rPr lang="en-GB" smtClean="0"/>
-              <a:t>09/05/2025</a:t>
+              <a:t>11/05/2025</a:t>
             </a:fld>
             <a:endParaRPr lang="en-GB"/>
           </a:p>
@@ -2723,7 +2723,7 @@
           <a:p>
             <a:fld id="{07F39D79-7497-4A8A-8B71-6E93BD0E3C8A}" type="datetimeFigureOut">
               <a:rPr lang="en-GB" smtClean="0"/>
-              <a:t>09/05/2025</a:t>
+              <a:t>11/05/2025</a:t>
             </a:fld>
             <a:endParaRPr lang="en-GB"/>
           </a:p>
@@ -2903,7 +2903,7 @@
           <a:p>
             <a:fld id="{07F39D79-7497-4A8A-8B71-6E93BD0E3C8A}" type="datetimeFigureOut">
               <a:rPr lang="en-GB" smtClean="0"/>
-              <a:t>09/05/2025</a:t>
+              <a:t>11/05/2025</a:t>
             </a:fld>
             <a:endParaRPr lang="en-GB"/>
           </a:p>
@@ -3073,7 +3073,7 @@
           <a:p>
             <a:fld id="{07F39D79-7497-4A8A-8B71-6E93BD0E3C8A}" type="datetimeFigureOut">
               <a:rPr lang="en-GB" smtClean="0"/>
-              <a:t>09/05/2025</a:t>
+              <a:t>11/05/2025</a:t>
             </a:fld>
             <a:endParaRPr lang="en-GB"/>
           </a:p>
@@ -3319,7 +3319,7 @@
           <a:p>
             <a:fld id="{07F39D79-7497-4A8A-8B71-6E93BD0E3C8A}" type="datetimeFigureOut">
               <a:rPr lang="en-GB" smtClean="0"/>
-              <a:t>09/05/2025</a:t>
+              <a:t>11/05/2025</a:t>
             </a:fld>
             <a:endParaRPr lang="en-GB"/>
           </a:p>
@@ -3611,7 +3611,7 @@
           <a:p>
             <a:fld id="{07F39D79-7497-4A8A-8B71-6E93BD0E3C8A}" type="datetimeFigureOut">
               <a:rPr lang="en-GB" smtClean="0"/>
-              <a:t>09/05/2025</a:t>
+              <a:t>11/05/2025</a:t>
             </a:fld>
             <a:endParaRPr lang="en-GB"/>
           </a:p>
@@ -4041,7 +4041,7 @@
           <a:p>
             <a:fld id="{07F39D79-7497-4A8A-8B71-6E93BD0E3C8A}" type="datetimeFigureOut">
               <a:rPr lang="en-GB" smtClean="0"/>
-              <a:t>09/05/2025</a:t>
+              <a:t>11/05/2025</a:t>
             </a:fld>
             <a:endParaRPr lang="en-GB"/>
           </a:p>
@@ -4164,7 +4164,7 @@
           <a:p>
             <a:fld id="{07F39D79-7497-4A8A-8B71-6E93BD0E3C8A}" type="datetimeFigureOut">
               <a:rPr lang="en-GB" smtClean="0"/>
-              <a:t>09/05/2025</a:t>
+              <a:t>11/05/2025</a:t>
             </a:fld>
             <a:endParaRPr lang="en-GB"/>
           </a:p>
@@ -4259,7 +4259,7 @@
           <a:p>
             <a:fld id="{07F39D79-7497-4A8A-8B71-6E93BD0E3C8A}" type="datetimeFigureOut">
               <a:rPr lang="en-GB" smtClean="0"/>
-              <a:t>09/05/2025</a:t>
+              <a:t>11/05/2025</a:t>
             </a:fld>
             <a:endParaRPr lang="en-GB"/>
           </a:p>
@@ -4542,7 +4542,7 @@
           <a:p>
             <a:fld id="{07F39D79-7497-4A8A-8B71-6E93BD0E3C8A}" type="datetimeFigureOut">
               <a:rPr lang="en-GB" smtClean="0"/>
-              <a:t>09/05/2025</a:t>
+              <a:t>11/05/2025</a:t>
             </a:fld>
             <a:endParaRPr lang="en-GB"/>
           </a:p>
@@ -4833,7 +4833,7 @@
           <a:p>
             <a:fld id="{07F39D79-7497-4A8A-8B71-6E93BD0E3C8A}" type="datetimeFigureOut">
               <a:rPr lang="en-GB" smtClean="0"/>
-              <a:t>09/05/2025</a:t>
+              <a:t>11/05/2025</a:t>
             </a:fld>
             <a:endParaRPr lang="en-GB"/>
           </a:p>
@@ -5064,7 +5064,7 @@
           <a:p>
             <a:fld id="{07F39D79-7497-4A8A-8B71-6E93BD0E3C8A}" type="datetimeFigureOut">
               <a:rPr lang="en-GB" smtClean="0"/>
-              <a:t>09/05/2025</a:t>
+              <a:t>11/05/2025</a:t>
             </a:fld>
             <a:endParaRPr lang="en-GB"/>
           </a:p>
@@ -6108,12 +6108,12 @@
           <a:lstStyle/>
           <a:p>
             <a:r>
-              <a:rPr lang="bg-BG" sz="4800" dirty="0">
+              <a:rPr lang="en-US" sz="4800" dirty="0">
                 <a:solidFill>
                   <a:srgbClr val="FF0000"/>
                 </a:solidFill>
               </a:rPr>
-              <a:t>Участници</a:t>
+              <a:t>Our team</a:t>
             </a:r>
             <a:endParaRPr lang="en-GB" sz="4800" dirty="0">
               <a:solidFill>
@@ -6155,45 +6155,32 @@
               <a:buNone/>
             </a:pPr>
             <a:r>
-              <a:rPr lang="bg-BG" sz="2200" dirty="0"/>
-              <a:t>Антонио Ивов Иванов</a:t>
-            </a:r>
-            <a:r>
               <a:rPr lang="en-US" sz="2200" dirty="0"/>
-              <a:t>     </a:t>
-            </a:r>
-            <a:r>
-              <a:rPr lang="bg-BG" sz="2200" dirty="0"/>
-              <a:t>Иван Георгиев Лапчев</a:t>
+              <a:t>Antonio Ivov Ivanov        Ivan Georgiev </a:t>
+            </a:r>
+            <a:r>
+              <a:rPr lang="en-US" sz="2200" dirty="0" err="1"/>
+              <a:t>Lapchev</a:t>
             </a:r>
             <a:r>
               <a:rPr lang="en-US" sz="2200" dirty="0"/>
-              <a:t>    </a:t>
-            </a:r>
-            <a:r>
-              <a:rPr lang="bg-BG" sz="2200" dirty="0" err="1"/>
-              <a:t>Берай</a:t>
-            </a:r>
-            <a:r>
-              <a:rPr lang="bg-BG" sz="2200" dirty="0"/>
-              <a:t> Гюнер Нури</a:t>
-            </a:r>
-            <a:r>
-              <a:rPr lang="en-US" sz="2200" dirty="0"/>
-              <a:t>   </a:t>
-            </a:r>
-            <a:r>
-              <a:rPr lang="bg-BG" sz="2200" dirty="0"/>
-              <a:t>Георги Галинов Гакев</a:t>
-            </a:r>
-          </a:p>
-          <a:p>
-            <a:pPr marL="457200" lvl="1" indent="0">
-              <a:buNone/>
-            </a:pPr>
+              <a:t> 	  Beray Guner Nuri</a:t>
+            </a:r>
             <a:r>
               <a:rPr lang="en-GB" sz="2000" dirty="0"/>
-              <a:t>   </a:t>
+              <a:t>   Georgi </a:t>
+            </a:r>
+            <a:r>
+              <a:rPr lang="en-GB" sz="2000" dirty="0" err="1"/>
+              <a:t>Galinov</a:t>
+            </a:r>
+            <a:r>
+              <a:rPr lang="en-GB" dirty="0"/>
+              <a:t> Gakev</a:t>
+            </a:r>
+            <a:r>
+              <a:rPr lang="en-GB" sz="2000" dirty="0"/>
+              <a:t>                        	</a:t>
             </a:r>
             <a:r>
               <a:rPr lang="en-GB" sz="2000" dirty="0">
@@ -6233,7 +6220,7 @@
                   <a:srgbClr val="FF0000"/>
                 </a:solidFill>
               </a:rPr>
-              <a:t>                 </a:t>
+              <a:t>               </a:t>
             </a:r>
             <a:r>
               <a:rPr lang="en-US" sz="2000" dirty="0">
@@ -6241,7 +6228,7 @@
                   <a:srgbClr val="FF0000"/>
                 </a:solidFill>
               </a:rPr>
-              <a:t>CSS Developer                    Designer</a:t>
+              <a:t>CSS Developer                 Designer</a:t>
             </a:r>
             <a:endParaRPr lang="bg-BG" dirty="0">
               <a:solidFill>
@@ -6251,8 +6238,8 @@
           </a:p>
         </p:txBody>
       </p:sp>
-      <mc:AlternateContent xmlns:mc="http://schemas.openxmlformats.org/markup-compatibility/2006">
-        <mc:Choice xmlns:p14="http://schemas.microsoft.com/office/powerpoint/2010/main" Requires="p14">
+      <mc:AlternateContent xmlns:mc="http://schemas.openxmlformats.org/markup-compatibility/2006" xmlns:p14="http://schemas.microsoft.com/office/powerpoint/2010/main">
+        <mc:Choice Requires="p14">
           <p:contentPart p14:bwMode="auto" r:id="rId2">
             <p14:nvContentPartPr>
               <p14:cNvPr id="6" name="Ink 5">
@@ -6271,7 +6258,7 @@
             </p14:xfrm>
           </p:contentPart>
         </mc:Choice>
-        <mc:Fallback>
+        <mc:Fallback xmlns="">
           <p:pic>
             <p:nvPicPr>
               <p:cNvPr id="6" name="Ink 5">
@@ -6595,17 +6582,17 @@
         </p:spPr>
         <p:txBody>
           <a:bodyPr anchor="b">
-            <a:normAutofit/>
+            <a:normAutofit fontScale="90000"/>
           </a:bodyPr>
           <a:lstStyle/>
           <a:p>
             <a:r>
-              <a:rPr lang="bg-BG" sz="5400" dirty="0">
+              <a:rPr lang="en-US" sz="5400" dirty="0">
                 <a:solidFill>
                   <a:srgbClr val="FF0000"/>
                 </a:solidFill>
               </a:rPr>
-              <a:t>Мисия</a:t>
+              <a:t>Mission</a:t>
             </a:r>
             <a:endParaRPr lang="en-GB" sz="5400" dirty="0">
               <a:solidFill>
@@ -6665,7 +6652,7 @@
         <p:spPr>
           <a:xfrm>
             <a:off x="5800840" y="2197474"/>
-            <a:ext cx="5903479" cy="1631216"/>
+            <a:ext cx="5903479" cy="1323439"/>
           </a:xfrm>
           <a:prstGeom prst="rect">
             <a:avLst/>
@@ -6684,18 +6671,9 @@
               <a:t>AutoDorm</a:t>
             </a:r>
             <a:r>
-              <a:rPr lang="bg-BG" sz="2000" dirty="0"/>
-              <a:t> е иновативна платформа, създаден с мисията да улесни избора на автомобил под наем. Нашата платформа е насочена за хора със различни </a:t>
-            </a:r>
-            <a:r>
-              <a:rPr lang="bg-BG" sz="2000" dirty="0" err="1"/>
-              <a:t>въможности</a:t>
-            </a:r>
-            <a:r>
-              <a:rPr lang="bg-BG" sz="2000" dirty="0"/>
-              <a:t>.</a:t>
-            </a:r>
-            <a:endParaRPr lang="en-US" sz="2000" dirty="0"/>
+              <a:rPr lang="en-US" sz="2000" dirty="0"/>
+              <a:t> is an innovative platform, created with the mission to make choosing a rental car easier. Our platform is aimed at people of all abilities.</a:t>
+            </a:r>
           </a:p>
         </p:txBody>
       </p:sp>
@@ -6709,13 +6687,13 @@
   <p:clrMapOvr>
     <a:masterClrMapping/>
   </p:clrMapOvr>
-  <mc:AlternateContent xmlns:mc="http://schemas.openxmlformats.org/markup-compatibility/2006">
-    <mc:Choice xmlns:p159="http://schemas.microsoft.com/office/powerpoint/2015/09/main" Requires="p159">
+  <mc:AlternateContent xmlns:mc="http://schemas.openxmlformats.org/markup-compatibility/2006" xmlns:p159="http://schemas.microsoft.com/office/powerpoint/2015/09/main">
+    <mc:Choice Requires="p159">
       <p:transition xmlns:p14="http://schemas.microsoft.com/office/powerpoint/2010/main" spd="slow" p14:dur="2000">
         <p159:morph option="byObject"/>
       </p:transition>
     </mc:Choice>
-    <mc:Fallback>
+    <mc:Fallback xmlns="">
       <p:transition spd="slow">
         <p:fade/>
       </p:transition>
@@ -6784,23 +6762,18 @@
           <a:lstStyle/>
           <a:p>
             <a:r>
-              <a:rPr lang="bg-BG" sz="4800" dirty="0">
+              <a:rPr lang="en-GB" sz="4800" dirty="0">
                 <a:solidFill>
                   <a:srgbClr val="FF0000"/>
                 </a:solidFill>
               </a:rPr>
-              <a:t>Технологии</a:t>
-            </a:r>
-            <a:endParaRPr lang="en-GB" sz="4800" dirty="0">
-              <a:solidFill>
-                <a:srgbClr val="FF0000"/>
-              </a:solidFill>
-            </a:endParaRPr>
-          </a:p>
-        </p:txBody>
-      </p:sp>
-      <mc:AlternateContent xmlns:mc="http://schemas.openxmlformats.org/markup-compatibility/2006">
-        <mc:Choice xmlns:p14="http://schemas.microsoft.com/office/powerpoint/2010/main" Requires="p14">
+              <a:t>Technologies</a:t>
+            </a:r>
+          </a:p>
+        </p:txBody>
+      </p:sp>
+      <mc:AlternateContent xmlns:mc="http://schemas.openxmlformats.org/markup-compatibility/2006" xmlns:p14="http://schemas.microsoft.com/office/powerpoint/2010/main">
+        <mc:Choice Requires="p14">
           <p:contentPart p14:bwMode="auto" r:id="rId2">
             <p14:nvContentPartPr>
               <p14:cNvPr id="6" name="Ink 5">
@@ -6819,7 +6792,7 @@
             </p14:xfrm>
           </p:contentPart>
         </mc:Choice>
-        <mc:Fallback>
+        <mc:Fallback xmlns="">
           <p:pic>
             <p:nvPicPr>
               <p:cNvPr id="6" name="Ink 5">
@@ -7168,13 +7141,13 @@
   <p:clrMapOvr>
     <a:masterClrMapping/>
   </p:clrMapOvr>
-  <mc:AlternateContent xmlns:mc="http://schemas.openxmlformats.org/markup-compatibility/2006">
-    <mc:Choice xmlns:p159="http://schemas.microsoft.com/office/powerpoint/2015/09/main" Requires="p159">
+  <mc:AlternateContent xmlns:mc="http://schemas.openxmlformats.org/markup-compatibility/2006" xmlns:p159="http://schemas.microsoft.com/office/powerpoint/2015/09/main">
+    <mc:Choice Requires="p159">
       <p:transition xmlns:p14="http://schemas.microsoft.com/office/powerpoint/2010/main" spd="slow" p14:dur="2000">
         <p159:morph option="byObject"/>
       </p:transition>
     </mc:Choice>
-    <mc:Fallback>
+    <mc:Fallback xmlns="">
       <p:transition spd="slow">
         <p:fade/>
       </p:transition>
@@ -7644,12 +7617,12 @@
           <a:lstStyle/>
           <a:p>
             <a:r>
-              <a:rPr lang="bg-BG" sz="5400" dirty="0" err="1">
+              <a:rPr lang="en-US" sz="5400" dirty="0">
                 <a:solidFill>
                   <a:srgbClr val="FF0000"/>
                 </a:solidFill>
               </a:rPr>
-              <a:t>ДЕмо</a:t>
+              <a:t>Demo</a:t>
             </a:r>
             <a:endParaRPr lang="en-GB" sz="5400" dirty="0">
               <a:solidFill>
@@ -7724,15 +7697,12 @@
           <a:p>
             <a:pPr algn="ctr"/>
             <a:r>
-              <a:rPr lang="bg-BG" sz="4000" b="1" dirty="0"/>
-              <a:t>Благодарим за вниманието! </a:t>
-            </a:r>
-          </a:p>
-          <a:p>
-            <a:pPr algn="ctr"/>
-            <a:r>
-              <a:rPr lang="bg-BG" sz="4000" b="1" dirty="0"/>
-              <a:t>Нека преминем към демото</a:t>
+              <a:rPr lang="en-US" sz="4000" b="1" dirty="0"/>
+              <a:t>Thank you for your attention! Let’s continue </a:t>
+            </a:r>
+            <a:r>
+              <a:rPr lang="en-US" sz="4000" b="1"/>
+              <a:t>with the demo! </a:t>
             </a:r>
             <a:endParaRPr lang="en-US" sz="4400" b="1" dirty="0"/>
           </a:p>
@@ -7748,13 +7718,13 @@
   <p:clrMapOvr>
     <a:masterClrMapping/>
   </p:clrMapOvr>
-  <mc:AlternateContent xmlns:mc="http://schemas.openxmlformats.org/markup-compatibility/2006">
-    <mc:Choice xmlns:p159="http://schemas.microsoft.com/office/powerpoint/2015/09/main" Requires="p159">
+  <mc:AlternateContent xmlns:mc="http://schemas.openxmlformats.org/markup-compatibility/2006" xmlns:p159="http://schemas.microsoft.com/office/powerpoint/2015/09/main">
+    <mc:Choice Requires="p159">
       <p:transition xmlns:p14="http://schemas.microsoft.com/office/powerpoint/2010/main" spd="slow" p14:dur="2000">
         <p159:morph option="byObject"/>
       </p:transition>
     </mc:Choice>
-    <mc:Fallback>
+    <mc:Fallback xmlns="">
       <p:transition spd="slow">
         <p:fade/>
       </p:transition>

</xml_diff>